<commit_message>
Speakers in all slides
</commit_message>
<xml_diff>
--- a/ez18n-slides/ez18n_apt_in_nutshell.pptx
+++ b/ez18n-slides/ez18n_apt_in_nutshell.pptx
@@ -5282,7 +5282,6 @@
               <a:rPr lang="en-US" sz="3700" dirty="0"/>
               <a:t>Speakers</a:t>
             </a:r>
-            <a:endParaRPr lang="en-US" sz="3700" dirty="0"/>
           </a:p>
         </p:txBody>
       </p:sp>
@@ -5594,11 +5593,11 @@
   <p:clrMapOvr>
     <a:masterClrMapping/>
   </p:clrMapOvr>
-  <mc:AlternateContent xmlns:mc="http://schemas.openxmlformats.org/markup-compatibility/2006">
-    <mc:Choice xmlns:p14="http://schemas.microsoft.com/office/powerpoint/2010/main" Requires="p14">
+  <mc:AlternateContent xmlns:mc="http://schemas.openxmlformats.org/markup-compatibility/2006" xmlns:p14="http://schemas.microsoft.com/office/powerpoint/2010/main">
+    <mc:Choice Requires="p14">
       <p:transition spd="slow" p14:dur="2000"/>
     </mc:Choice>
-    <mc:Fallback>
+    <mc:Fallback xmlns="">
       <p:transition xmlns:p14="http://schemas.microsoft.com/office/powerpoint/2010/main" spd="slow"/>
     </mc:Fallback>
   </mc:AlternateContent>

</xml_diff>

<commit_message>
fixed speaker bio + slides PDF
</commit_message>
<xml_diff>
--- a/ez18n-slides/ez18n_apt_in_nutshell.pptx
+++ b/ez18n-slides/ez18n_apt_in_nutshell.pptx
@@ -5355,12 +5355,12 @@
           <a:p>
             <a:pPr marL="216027" indent="-216027"/>
             <a:r>
-              <a:rPr lang="fr-FR" sz="2000" b="1" dirty="0" err="1" smtClean="0"/>
-              <a:t>Developpeur</a:t>
-            </a:r>
-            <a:r>
               <a:rPr lang="fr-FR" sz="2000" b="1" dirty="0" smtClean="0"/>
-              <a:t> de plus de 30 ans</a:t>
+              <a:t>Développeur </a:t>
+            </a:r>
+            <a:r>
+              <a:rPr lang="fr-FR" sz="2000" b="1" dirty="0" smtClean="0"/>
+              <a:t>de plus de 30 ans</a:t>
             </a:r>
           </a:p>
           <a:p>
@@ -5438,20 +5438,32 @@
           <a:p>
             <a:pPr marL="216027" indent="-216027"/>
             <a:r>
-              <a:rPr lang="fr-FR" sz="2000" b="1" dirty="0" err="1"/>
-              <a:t>Dévelopeur</a:t>
+              <a:rPr lang="fr-FR" sz="2000" b="1" dirty="0" smtClean="0"/>
+              <a:t>Développeur </a:t>
             </a:r>
             <a:r>
               <a:rPr lang="fr-FR" sz="2000" b="1" dirty="0"/>
-              <a:t> java depuis 1999</a:t>
+              <a:t>java depuis 1999</a:t>
             </a:r>
           </a:p>
           <a:p>
             <a:pPr marL="216027" indent="-216027"/>
             <a:r>
               <a:rPr lang="fr-FR" sz="2000" b="1" dirty="0"/>
-              <a:t>Architecte pour</a:t>
-            </a:r>
+              <a:t>Architecte </a:t>
+            </a:r>
+            <a:r>
+              <a:rPr lang="fr-FR" sz="2000" b="1" dirty="0" smtClean="0"/>
+              <a:t>pour</a:t>
+            </a:r>
+          </a:p>
+          <a:p>
+            <a:pPr marL="216027" indent="-216027"/>
+            <a:endParaRPr lang="fr-FR" sz="2000" b="1" dirty="0"/>
+          </a:p>
+          <a:p>
+            <a:pPr marL="216027" indent="-216027"/>
+            <a:endParaRPr lang="fr-FR" sz="2000" b="1" dirty="0"/>
           </a:p>
           <a:p>
             <a:pPr marL="216027" indent="-216027"/>
@@ -5586,7 +5598,7 @@
         </p:blipFill>
         <p:spPr>
           <a:xfrm>
-            <a:off x="6553200" y="2667000"/>
+            <a:off x="5562600" y="3124200"/>
             <a:ext cx="2336800" cy="436021"/>
           </a:xfrm>
           <a:prstGeom prst="rect">

</xml_diff>